<commit_message>
minor changes to int assign and intro lecture
</commit_message>
<xml_diff>
--- a/assets/lectures/cbw/2023/full/RNASeq_Module0_Introductions.pptx
+++ b/assets/lectures/cbw/2023/full/RNASeq_Module0_Introductions.pptx
@@ -2572,7 +2572,7 @@
   <p:clrMapOvr>
     <a:masterClrMapping/>
   </p:clrMapOvr>
-  <p:extLst mod="1">
+  <p:extLst>
     <p:ext uri="{DCECCB84-F9BA-43D5-87BE-67443E8EF086}">
       <p15:sldGuideLst xmlns:p15="http://schemas.microsoft.com/office/powerpoint/2012/main">
         <p15:guide id="1" orient="horz" pos="2160">
@@ -2906,14 +2906,14 @@
           </a:ln>
           <a:extLst>
             <a:ext uri="{909E8E84-426E-40dd-AFC4-6F175D3DCCD1}">
-              <a14:hiddenFill xmlns="" xmlns:a14="http://schemas.microsoft.com/office/drawing/2010/main">
+              <a14:hiddenFill xmlns:a14="http://schemas.microsoft.com/office/drawing/2010/main" xmlns="">
                 <a:solidFill>
                   <a:srgbClr val="FFFFFF"/>
                 </a:solidFill>
               </a14:hiddenFill>
             </a:ext>
             <a:ext uri="{91240B29-F687-4f45-9708-019B960494DF}">
-              <a14:hiddenLine xmlns="" xmlns:a14="http://schemas.microsoft.com/office/drawing/2010/main" w="9525">
+              <a14:hiddenLine xmlns:a14="http://schemas.microsoft.com/office/drawing/2010/main" xmlns="" w="9525">
                 <a:solidFill>
                   <a:srgbClr val="000000"/>
                 </a:solidFill>
@@ -2923,7 +2923,7 @@
               </a14:hiddenLine>
             </a:ext>
             <a:ext uri="{FAA26D3D-D897-4be2-8F04-BA451C77F1D7}">
-              <ma14:placeholderFlag xmlns="" xmlns:ma14="http://schemas.microsoft.com/office/mac/drawingml/2011/main" val="1"/>
+              <ma14:placeholderFlag xmlns:ma14="http://schemas.microsoft.com/office/mac/drawingml/2011/main" xmlns="" val="1"/>
             </a:ext>
           </a:extLst>
         </p:spPr>
@@ -2967,14 +2967,14 @@
           </a:ln>
           <a:extLst>
             <a:ext uri="{909E8E84-426E-40dd-AFC4-6F175D3DCCD1}">
-              <a14:hiddenFill xmlns="" xmlns:a14="http://schemas.microsoft.com/office/drawing/2010/main">
+              <a14:hiddenFill xmlns:a14="http://schemas.microsoft.com/office/drawing/2010/main" xmlns="">
                 <a:solidFill>
                   <a:srgbClr val="FFFFFF"/>
                 </a:solidFill>
               </a14:hiddenFill>
             </a:ext>
             <a:ext uri="{91240B29-F687-4f45-9708-019B960494DF}">
-              <a14:hiddenLine xmlns="" xmlns:a14="http://schemas.microsoft.com/office/drawing/2010/main" w="9525">
+              <a14:hiddenLine xmlns:a14="http://schemas.microsoft.com/office/drawing/2010/main" xmlns="" w="9525">
                 <a:solidFill>
                   <a:srgbClr val="000000"/>
                 </a:solidFill>
@@ -2984,7 +2984,7 @@
               </a14:hiddenLine>
             </a:ext>
             <a:ext uri="{FAA26D3D-D897-4be2-8F04-BA451C77F1D7}">
-              <ma14:placeholderFlag xmlns="" xmlns:ma14="http://schemas.microsoft.com/office/mac/drawingml/2011/main" val="1"/>
+              <ma14:placeholderFlag xmlns:ma14="http://schemas.microsoft.com/office/mac/drawingml/2011/main" xmlns="" val="1"/>
             </a:ext>
           </a:extLst>
         </p:spPr>
@@ -3120,14 +3120,14 @@
           </a:ln>
           <a:extLst>
             <a:ext uri="{909E8E84-426E-40dd-AFC4-6F175D3DCCD1}">
-              <a14:hiddenFill xmlns="" xmlns:a14="http://schemas.microsoft.com/office/drawing/2010/main">
+              <a14:hiddenFill xmlns:a14="http://schemas.microsoft.com/office/drawing/2010/main" xmlns="">
                 <a:solidFill>
                   <a:srgbClr val="FFFFFF"/>
                 </a:solidFill>
               </a14:hiddenFill>
             </a:ext>
             <a:ext uri="{91240B29-F687-4f45-9708-019B960494DF}">
-              <a14:hiddenLine xmlns="" xmlns:a14="http://schemas.microsoft.com/office/drawing/2010/main" w="9525">
+              <a14:hiddenLine xmlns:a14="http://schemas.microsoft.com/office/drawing/2010/main" xmlns="" w="9525">
                 <a:solidFill>
                   <a:srgbClr val="000000"/>
                 </a:solidFill>
@@ -4846,7 +4846,7 @@
           <a:p>
             <a:r>
               <a:rPr lang="en-US" dirty="0"/>
-              <a:t>Introduction to course– philosophy and goals</a:t>
+              <a:t>Introduction to course – philosophy and goals</a:t>
             </a:r>
           </a:p>
         </p:txBody>

</xml_diff>